<commit_message>
added simple transform tool
</commit_message>
<xml_diff>
--- a/res/icons.pptx
+++ b/res/icons.pptx
@@ -7,10 +7,11 @@
   <p:sldIdLst>
     <p:sldId id="256" r:id="rId2"/>
     <p:sldId id="257" r:id="rId3"/>
-    <p:sldId id="258" r:id="rId4"/>
-    <p:sldId id="259" r:id="rId5"/>
-    <p:sldId id="260" r:id="rId6"/>
-    <p:sldId id="261" r:id="rId7"/>
+    <p:sldId id="263" r:id="rId4"/>
+    <p:sldId id="258" r:id="rId5"/>
+    <p:sldId id="259" r:id="rId6"/>
+    <p:sldId id="260" r:id="rId7"/>
+    <p:sldId id="261" r:id="rId8"/>
   </p:sldIdLst>
   <p:sldSz cx="914400" cy="914400"/>
   <p:notesSz cx="6858000" cy="9144000"/>
@@ -248,7 +249,7 @@
           <a:p>
             <a:fld id="{926ADD6E-0CE0-40D6-AB96-5DE797FF94CF}" type="datetimeFigureOut">
               <a:rPr lang="en-US" smtClean="0"/>
-              <a:t>3/27/2019</a:t>
+              <a:t>6/24/2021</a:t>
             </a:fld>
             <a:endParaRPr lang="en-US"/>
           </a:p>
@@ -418,7 +419,7 @@
           <a:p>
             <a:fld id="{926ADD6E-0CE0-40D6-AB96-5DE797FF94CF}" type="datetimeFigureOut">
               <a:rPr lang="en-US" smtClean="0"/>
-              <a:t>3/27/2019</a:t>
+              <a:t>6/24/2021</a:t>
             </a:fld>
             <a:endParaRPr lang="en-US"/>
           </a:p>
@@ -598,7 +599,7 @@
           <a:p>
             <a:fld id="{926ADD6E-0CE0-40D6-AB96-5DE797FF94CF}" type="datetimeFigureOut">
               <a:rPr lang="en-US" smtClean="0"/>
-              <a:t>3/27/2019</a:t>
+              <a:t>6/24/2021</a:t>
             </a:fld>
             <a:endParaRPr lang="en-US"/>
           </a:p>
@@ -768,7 +769,7 @@
           <a:p>
             <a:fld id="{926ADD6E-0CE0-40D6-AB96-5DE797FF94CF}" type="datetimeFigureOut">
               <a:rPr lang="en-US" smtClean="0"/>
-              <a:t>3/27/2019</a:t>
+              <a:t>6/24/2021</a:t>
             </a:fld>
             <a:endParaRPr lang="en-US"/>
           </a:p>
@@ -1012,7 +1013,7 @@
           <a:p>
             <a:fld id="{926ADD6E-0CE0-40D6-AB96-5DE797FF94CF}" type="datetimeFigureOut">
               <a:rPr lang="en-US" smtClean="0"/>
-              <a:t>3/27/2019</a:t>
+              <a:t>6/24/2021</a:t>
             </a:fld>
             <a:endParaRPr lang="en-US"/>
           </a:p>
@@ -1244,7 +1245,7 @@
           <a:p>
             <a:fld id="{926ADD6E-0CE0-40D6-AB96-5DE797FF94CF}" type="datetimeFigureOut">
               <a:rPr lang="en-US" smtClean="0"/>
-              <a:t>3/27/2019</a:t>
+              <a:t>6/24/2021</a:t>
             </a:fld>
             <a:endParaRPr lang="en-US"/>
           </a:p>
@@ -1611,7 +1612,7 @@
           <a:p>
             <a:fld id="{926ADD6E-0CE0-40D6-AB96-5DE797FF94CF}" type="datetimeFigureOut">
               <a:rPr lang="en-US" smtClean="0"/>
-              <a:t>3/27/2019</a:t>
+              <a:t>6/24/2021</a:t>
             </a:fld>
             <a:endParaRPr lang="en-US"/>
           </a:p>
@@ -1729,7 +1730,7 @@
           <a:p>
             <a:fld id="{926ADD6E-0CE0-40D6-AB96-5DE797FF94CF}" type="datetimeFigureOut">
               <a:rPr lang="en-US" smtClean="0"/>
-              <a:t>3/27/2019</a:t>
+              <a:t>6/24/2021</a:t>
             </a:fld>
             <a:endParaRPr lang="en-US"/>
           </a:p>
@@ -1824,7 +1825,7 @@
           <a:p>
             <a:fld id="{926ADD6E-0CE0-40D6-AB96-5DE797FF94CF}" type="datetimeFigureOut">
               <a:rPr lang="en-US" smtClean="0"/>
-              <a:t>3/27/2019</a:t>
+              <a:t>6/24/2021</a:t>
             </a:fld>
             <a:endParaRPr lang="en-US"/>
           </a:p>
@@ -2101,7 +2102,7 @@
           <a:p>
             <a:fld id="{926ADD6E-0CE0-40D6-AB96-5DE797FF94CF}" type="datetimeFigureOut">
               <a:rPr lang="en-US" smtClean="0"/>
-              <a:t>3/27/2019</a:t>
+              <a:t>6/24/2021</a:t>
             </a:fld>
             <a:endParaRPr lang="en-US"/>
           </a:p>
@@ -2358,7 +2359,7 @@
           <a:p>
             <a:fld id="{926ADD6E-0CE0-40D6-AB96-5DE797FF94CF}" type="datetimeFigureOut">
               <a:rPr lang="en-US" smtClean="0"/>
-              <a:t>3/27/2019</a:t>
+              <a:t>6/24/2021</a:t>
             </a:fld>
             <a:endParaRPr lang="en-US"/>
           </a:p>
@@ -2571,7 +2572,7 @@
           <a:p>
             <a:fld id="{926ADD6E-0CE0-40D6-AB96-5DE797FF94CF}" type="datetimeFigureOut">
               <a:rPr lang="en-US" smtClean="0"/>
-              <a:t>3/27/2019</a:t>
+              <a:t>6/24/2021</a:t>
             </a:fld>
             <a:endParaRPr lang="en-US"/>
           </a:p>
@@ -4967,6 +4968,595 @@
 </file>
 
 <file path=ppt/slides/slide3.xml><?xml version="1.0" encoding="utf-8"?>
+<p:sld xmlns:a="http://schemas.openxmlformats.org/drawingml/2006/main" xmlns:r="http://schemas.openxmlformats.org/officeDocument/2006/relationships" xmlns:p="http://schemas.openxmlformats.org/presentationml/2006/main">
+  <p:cSld>
+    <p:spTree>
+      <p:nvGrpSpPr>
+        <p:cNvPr id="1" name=""/>
+        <p:cNvGrpSpPr/>
+        <p:nvPr/>
+      </p:nvGrpSpPr>
+      <p:grpSpPr>
+        <a:xfrm>
+          <a:off x="0" y="0"/>
+          <a:ext cx="0" cy="0"/>
+          <a:chOff x="0" y="0"/>
+          <a:chExt cx="0" cy="0"/>
+        </a:xfrm>
+      </p:grpSpPr>
+      <p:sp>
+        <p:nvSpPr>
+          <p:cNvPr id="17" name="Abgerundetes Rechteck 16"/>
+          <p:cNvSpPr/>
+          <p:nvPr/>
+        </p:nvSpPr>
+        <p:spPr>
+          <a:xfrm>
+            <a:off x="18288" y="18288"/>
+            <a:ext cx="877824" cy="877824"/>
+          </a:xfrm>
+          <a:prstGeom prst="roundRect">
+            <a:avLst/>
+          </a:prstGeom>
+          <a:solidFill>
+            <a:schemeClr val="accent4">
+              <a:lumMod val="20000"/>
+              <a:lumOff val="80000"/>
+            </a:schemeClr>
+          </a:solidFill>
+          <a:ln w="28575">
+            <a:solidFill>
+              <a:schemeClr val="accent4">
+                <a:lumMod val="60000"/>
+                <a:lumOff val="40000"/>
+              </a:schemeClr>
+            </a:solidFill>
+          </a:ln>
+          <a:scene3d>
+            <a:camera prst="orthographicFront"/>
+            <a:lightRig rig="threePt" dir="t"/>
+          </a:scene3d>
+          <a:sp3d>
+            <a:bevelT w="139700" prst="cross"/>
+          </a:sp3d>
+        </p:spPr>
+        <p:style>
+          <a:lnRef idx="2">
+            <a:schemeClr val="accent1">
+              <a:shade val="50000"/>
+            </a:schemeClr>
+          </a:lnRef>
+          <a:fillRef idx="1">
+            <a:schemeClr val="accent1"/>
+          </a:fillRef>
+          <a:effectRef idx="0">
+            <a:schemeClr val="accent1"/>
+          </a:effectRef>
+          <a:fontRef idx="minor">
+            <a:schemeClr val="lt1"/>
+          </a:fontRef>
+        </p:style>
+        <p:txBody>
+          <a:bodyPr rot="0" spcFirstLastPara="0" vertOverflow="overflow" horzOverflow="overflow" vert="horz" wrap="square" lIns="91440" tIns="45720" rIns="91440" bIns="45720" numCol="1" spcCol="0" rtlCol="0" fromWordArt="0" anchor="ctr" anchorCtr="0" forceAA="0" compatLnSpc="1">
+            <a:prstTxWarp prst="textNoShape">
+              <a:avLst/>
+            </a:prstTxWarp>
+            <a:noAutofit/>
+          </a:bodyPr>
+          <a:lstStyle/>
+          <a:p>
+            <a:pPr algn="ctr"/>
+            <a:endParaRPr lang="en-US"/>
+          </a:p>
+        </p:txBody>
+      </p:sp>
+      <p:grpSp>
+        <p:nvGrpSpPr>
+          <p:cNvPr id="2" name="Gruppieren 1"/>
+          <p:cNvGrpSpPr/>
+          <p:nvPr/>
+        </p:nvGrpSpPr>
+        <p:grpSpPr>
+          <a:xfrm>
+            <a:off x="99057" y="141643"/>
+            <a:ext cx="453095" cy="369978"/>
+            <a:chOff x="206213" y="227368"/>
+            <a:chExt cx="453095" cy="369978"/>
+          </a:xfrm>
+        </p:grpSpPr>
+        <p:sp>
+          <p:nvSpPr>
+            <p:cNvPr id="31" name="Pfeil nach rechts 30"/>
+            <p:cNvSpPr/>
+            <p:nvPr/>
+          </p:nvSpPr>
+          <p:spPr>
+            <a:xfrm>
+              <a:off x="453969" y="450099"/>
+              <a:ext cx="205339" cy="45719"/>
+            </a:xfrm>
+            <a:prstGeom prst="rightArrow">
+              <a:avLst>
+                <a:gd name="adj1" fmla="val 50000"/>
+                <a:gd name="adj2" fmla="val 129325"/>
+              </a:avLst>
+            </a:prstGeom>
+            <a:solidFill>
+              <a:schemeClr val="accent5">
+                <a:lumMod val="60000"/>
+                <a:lumOff val="40000"/>
+              </a:schemeClr>
+            </a:solidFill>
+            <a:ln>
+              <a:solidFill>
+                <a:schemeClr val="accent5"/>
+              </a:solidFill>
+            </a:ln>
+          </p:spPr>
+          <p:style>
+            <a:lnRef idx="2">
+              <a:schemeClr val="accent1">
+                <a:shade val="50000"/>
+              </a:schemeClr>
+            </a:lnRef>
+            <a:fillRef idx="1">
+              <a:schemeClr val="accent1"/>
+            </a:fillRef>
+            <a:effectRef idx="0">
+              <a:schemeClr val="accent1"/>
+            </a:effectRef>
+            <a:fontRef idx="minor">
+              <a:schemeClr val="lt1"/>
+            </a:fontRef>
+          </p:style>
+          <p:txBody>
+            <a:bodyPr rot="0" spcFirstLastPara="0" vertOverflow="overflow" horzOverflow="overflow" vert="horz" wrap="square" lIns="91440" tIns="45720" rIns="91440" bIns="45720" numCol="1" spcCol="0" rtlCol="0" fromWordArt="0" anchor="ctr" anchorCtr="0" forceAA="0" compatLnSpc="1">
+              <a:prstTxWarp prst="textNoShape">
+                <a:avLst/>
+              </a:prstTxWarp>
+              <a:noAutofit/>
+            </a:bodyPr>
+            <a:lstStyle/>
+            <a:p>
+              <a:pPr algn="ctr"/>
+              <a:endParaRPr lang="en-US"/>
+            </a:p>
+          </p:txBody>
+        </p:sp>
+        <p:sp>
+          <p:nvSpPr>
+            <p:cNvPr id="32" name="Pfeil nach rechts 31"/>
+            <p:cNvSpPr/>
+            <p:nvPr/>
+          </p:nvSpPr>
+          <p:spPr>
+            <a:xfrm rot="8225030">
+              <a:off x="206213" y="551627"/>
+              <a:ext cx="205339" cy="45719"/>
+            </a:xfrm>
+            <a:prstGeom prst="rightArrow">
+              <a:avLst>
+                <a:gd name="adj1" fmla="val 50000"/>
+                <a:gd name="adj2" fmla="val 129325"/>
+              </a:avLst>
+            </a:prstGeom>
+            <a:solidFill>
+              <a:srgbClr val="FF0000"/>
+            </a:solidFill>
+            <a:ln>
+              <a:solidFill>
+                <a:srgbClr val="C00000"/>
+              </a:solidFill>
+            </a:ln>
+          </p:spPr>
+          <p:style>
+            <a:lnRef idx="2">
+              <a:schemeClr val="accent1">
+                <a:shade val="50000"/>
+              </a:schemeClr>
+            </a:lnRef>
+            <a:fillRef idx="1">
+              <a:schemeClr val="accent1"/>
+            </a:fillRef>
+            <a:effectRef idx="0">
+              <a:schemeClr val="accent1"/>
+            </a:effectRef>
+            <a:fontRef idx="minor">
+              <a:schemeClr val="lt1"/>
+            </a:fontRef>
+          </p:style>
+          <p:txBody>
+            <a:bodyPr rot="0" spcFirstLastPara="0" vertOverflow="overflow" horzOverflow="overflow" vert="horz" wrap="square" lIns="91440" tIns="45720" rIns="91440" bIns="45720" numCol="1" spcCol="0" rtlCol="0" fromWordArt="0" anchor="ctr" anchorCtr="0" forceAA="0" compatLnSpc="1">
+              <a:prstTxWarp prst="textNoShape">
+                <a:avLst/>
+              </a:prstTxWarp>
+              <a:noAutofit/>
+            </a:bodyPr>
+            <a:lstStyle/>
+            <a:p>
+              <a:pPr algn="ctr"/>
+              <a:endParaRPr lang="en-US"/>
+            </a:p>
+          </p:txBody>
+        </p:sp>
+        <p:sp>
+          <p:nvSpPr>
+            <p:cNvPr id="28" name="Pfeil nach rechts 27"/>
+            <p:cNvSpPr/>
+            <p:nvPr/>
+          </p:nvSpPr>
+          <p:spPr>
+            <a:xfrm rot="16200000">
+              <a:off x="310747" y="307178"/>
+              <a:ext cx="205339" cy="45719"/>
+            </a:xfrm>
+            <a:prstGeom prst="rightArrow">
+              <a:avLst>
+                <a:gd name="adj1" fmla="val 50000"/>
+                <a:gd name="adj2" fmla="val 129325"/>
+              </a:avLst>
+            </a:prstGeom>
+            <a:solidFill>
+              <a:schemeClr val="accent6"/>
+            </a:solidFill>
+            <a:ln>
+              <a:solidFill>
+                <a:schemeClr val="accent6">
+                  <a:lumMod val="75000"/>
+                </a:schemeClr>
+              </a:solidFill>
+            </a:ln>
+          </p:spPr>
+          <p:style>
+            <a:lnRef idx="2">
+              <a:schemeClr val="accent1">
+                <a:shade val="50000"/>
+              </a:schemeClr>
+            </a:lnRef>
+            <a:fillRef idx="1">
+              <a:schemeClr val="accent1"/>
+            </a:fillRef>
+            <a:effectRef idx="0">
+              <a:schemeClr val="accent1"/>
+            </a:effectRef>
+            <a:fontRef idx="minor">
+              <a:schemeClr val="lt1"/>
+            </a:fontRef>
+          </p:style>
+          <p:txBody>
+            <a:bodyPr rot="0" spcFirstLastPara="0" vertOverflow="overflow" horzOverflow="overflow" vert="horz" wrap="square" lIns="91440" tIns="45720" rIns="91440" bIns="45720" numCol="1" spcCol="0" rtlCol="0" fromWordArt="0" anchor="ctr" anchorCtr="0" forceAA="0" compatLnSpc="1">
+              <a:prstTxWarp prst="textNoShape">
+                <a:avLst/>
+              </a:prstTxWarp>
+              <a:noAutofit/>
+            </a:bodyPr>
+            <a:lstStyle/>
+            <a:p>
+              <a:pPr algn="ctr"/>
+              <a:endParaRPr lang="en-US"/>
+            </a:p>
+          </p:txBody>
+        </p:sp>
+        <p:sp>
+          <p:nvSpPr>
+            <p:cNvPr id="25" name="Ellipse 24"/>
+            <p:cNvSpPr/>
+            <p:nvPr/>
+          </p:nvSpPr>
+          <p:spPr>
+            <a:xfrm>
+              <a:off x="370654" y="431049"/>
+              <a:ext cx="86546" cy="87734"/>
+            </a:xfrm>
+            <a:prstGeom prst="ellipse">
+              <a:avLst/>
+            </a:prstGeom>
+            <a:solidFill>
+              <a:schemeClr val="bg2"/>
+            </a:solidFill>
+            <a:ln>
+              <a:solidFill>
+                <a:schemeClr val="bg2">
+                  <a:lumMod val="75000"/>
+                </a:schemeClr>
+              </a:solidFill>
+            </a:ln>
+          </p:spPr>
+          <p:style>
+            <a:lnRef idx="2">
+              <a:schemeClr val="accent1">
+                <a:shade val="50000"/>
+              </a:schemeClr>
+            </a:lnRef>
+            <a:fillRef idx="1">
+              <a:schemeClr val="accent1"/>
+            </a:fillRef>
+            <a:effectRef idx="0">
+              <a:schemeClr val="accent1"/>
+            </a:effectRef>
+            <a:fontRef idx="minor">
+              <a:schemeClr val="lt1"/>
+            </a:fontRef>
+          </p:style>
+          <p:txBody>
+            <a:bodyPr rot="0" spcFirstLastPara="0" vertOverflow="overflow" horzOverflow="overflow" vert="horz" wrap="square" lIns="91440" tIns="45720" rIns="91440" bIns="45720" numCol="1" spcCol="0" rtlCol="0" fromWordArt="0" anchor="ctr" anchorCtr="0" forceAA="0" compatLnSpc="1">
+              <a:prstTxWarp prst="textNoShape">
+                <a:avLst/>
+              </a:prstTxWarp>
+              <a:noAutofit/>
+            </a:bodyPr>
+            <a:lstStyle/>
+            <a:p>
+              <a:pPr algn="ctr"/>
+              <a:endParaRPr lang="en-US"/>
+            </a:p>
+          </p:txBody>
+        </p:sp>
+      </p:grpSp>
+      <p:grpSp>
+        <p:nvGrpSpPr>
+          <p:cNvPr id="29" name="Gruppieren 28"/>
+          <p:cNvGrpSpPr/>
+          <p:nvPr/>
+        </p:nvGrpSpPr>
+        <p:grpSpPr>
+          <a:xfrm rot="1563166">
+            <a:off x="268423" y="293874"/>
+            <a:ext cx="556209" cy="454176"/>
+            <a:chOff x="206213" y="227368"/>
+            <a:chExt cx="453095" cy="369978"/>
+          </a:xfrm>
+        </p:grpSpPr>
+        <p:sp>
+          <p:nvSpPr>
+            <p:cNvPr id="30" name="Pfeil nach rechts 29"/>
+            <p:cNvSpPr/>
+            <p:nvPr/>
+          </p:nvSpPr>
+          <p:spPr>
+            <a:xfrm>
+              <a:off x="453969" y="450099"/>
+              <a:ext cx="205339" cy="45719"/>
+            </a:xfrm>
+            <a:prstGeom prst="rightArrow">
+              <a:avLst>
+                <a:gd name="adj1" fmla="val 50000"/>
+                <a:gd name="adj2" fmla="val 129325"/>
+              </a:avLst>
+            </a:prstGeom>
+            <a:solidFill>
+              <a:schemeClr val="accent5">
+                <a:lumMod val="60000"/>
+                <a:lumOff val="40000"/>
+              </a:schemeClr>
+            </a:solidFill>
+            <a:ln>
+              <a:solidFill>
+                <a:schemeClr val="accent5"/>
+              </a:solidFill>
+            </a:ln>
+          </p:spPr>
+          <p:style>
+            <a:lnRef idx="2">
+              <a:schemeClr val="accent1">
+                <a:shade val="50000"/>
+              </a:schemeClr>
+            </a:lnRef>
+            <a:fillRef idx="1">
+              <a:schemeClr val="accent1"/>
+            </a:fillRef>
+            <a:effectRef idx="0">
+              <a:schemeClr val="accent1"/>
+            </a:effectRef>
+            <a:fontRef idx="minor">
+              <a:schemeClr val="lt1"/>
+            </a:fontRef>
+          </p:style>
+          <p:txBody>
+            <a:bodyPr rot="0" spcFirstLastPara="0" vertOverflow="overflow" horzOverflow="overflow" vert="horz" wrap="square" lIns="91440" tIns="45720" rIns="91440" bIns="45720" numCol="1" spcCol="0" rtlCol="0" fromWordArt="0" anchor="ctr" anchorCtr="0" forceAA="0" compatLnSpc="1">
+              <a:prstTxWarp prst="textNoShape">
+                <a:avLst/>
+              </a:prstTxWarp>
+              <a:noAutofit/>
+            </a:bodyPr>
+            <a:lstStyle/>
+            <a:p>
+              <a:pPr algn="ctr"/>
+              <a:endParaRPr lang="en-US"/>
+            </a:p>
+          </p:txBody>
+        </p:sp>
+        <p:sp>
+          <p:nvSpPr>
+            <p:cNvPr id="42" name="Pfeil nach rechts 41"/>
+            <p:cNvSpPr/>
+            <p:nvPr/>
+          </p:nvSpPr>
+          <p:spPr>
+            <a:xfrm rot="8225030">
+              <a:off x="206213" y="551627"/>
+              <a:ext cx="205339" cy="45719"/>
+            </a:xfrm>
+            <a:prstGeom prst="rightArrow">
+              <a:avLst>
+                <a:gd name="adj1" fmla="val 50000"/>
+                <a:gd name="adj2" fmla="val 129325"/>
+              </a:avLst>
+            </a:prstGeom>
+            <a:solidFill>
+              <a:srgbClr val="FF0000"/>
+            </a:solidFill>
+            <a:ln>
+              <a:solidFill>
+                <a:srgbClr val="C00000"/>
+              </a:solidFill>
+            </a:ln>
+          </p:spPr>
+          <p:style>
+            <a:lnRef idx="2">
+              <a:schemeClr val="accent1">
+                <a:shade val="50000"/>
+              </a:schemeClr>
+            </a:lnRef>
+            <a:fillRef idx="1">
+              <a:schemeClr val="accent1"/>
+            </a:fillRef>
+            <a:effectRef idx="0">
+              <a:schemeClr val="accent1"/>
+            </a:effectRef>
+            <a:fontRef idx="minor">
+              <a:schemeClr val="lt1"/>
+            </a:fontRef>
+          </p:style>
+          <p:txBody>
+            <a:bodyPr rot="0" spcFirstLastPara="0" vertOverflow="overflow" horzOverflow="overflow" vert="horz" wrap="square" lIns="91440" tIns="45720" rIns="91440" bIns="45720" numCol="1" spcCol="0" rtlCol="0" fromWordArt="0" anchor="ctr" anchorCtr="0" forceAA="0" compatLnSpc="1">
+              <a:prstTxWarp prst="textNoShape">
+                <a:avLst/>
+              </a:prstTxWarp>
+              <a:noAutofit/>
+            </a:bodyPr>
+            <a:lstStyle/>
+            <a:p>
+              <a:pPr algn="ctr"/>
+              <a:endParaRPr lang="en-US"/>
+            </a:p>
+          </p:txBody>
+        </p:sp>
+        <p:sp>
+          <p:nvSpPr>
+            <p:cNvPr id="43" name="Pfeil nach rechts 42"/>
+            <p:cNvSpPr/>
+            <p:nvPr/>
+          </p:nvSpPr>
+          <p:spPr>
+            <a:xfrm rot="16200000">
+              <a:off x="310747" y="307178"/>
+              <a:ext cx="205339" cy="45719"/>
+            </a:xfrm>
+            <a:prstGeom prst="rightArrow">
+              <a:avLst>
+                <a:gd name="adj1" fmla="val 50000"/>
+                <a:gd name="adj2" fmla="val 129325"/>
+              </a:avLst>
+            </a:prstGeom>
+            <a:solidFill>
+              <a:schemeClr val="accent6"/>
+            </a:solidFill>
+            <a:ln>
+              <a:solidFill>
+                <a:schemeClr val="accent6">
+                  <a:lumMod val="75000"/>
+                </a:schemeClr>
+              </a:solidFill>
+            </a:ln>
+          </p:spPr>
+          <p:style>
+            <a:lnRef idx="2">
+              <a:schemeClr val="accent1">
+                <a:shade val="50000"/>
+              </a:schemeClr>
+            </a:lnRef>
+            <a:fillRef idx="1">
+              <a:schemeClr val="accent1"/>
+            </a:fillRef>
+            <a:effectRef idx="0">
+              <a:schemeClr val="accent1"/>
+            </a:effectRef>
+            <a:fontRef idx="minor">
+              <a:schemeClr val="lt1"/>
+            </a:fontRef>
+          </p:style>
+          <p:txBody>
+            <a:bodyPr rot="0" spcFirstLastPara="0" vertOverflow="overflow" horzOverflow="overflow" vert="horz" wrap="square" lIns="91440" tIns="45720" rIns="91440" bIns="45720" numCol="1" spcCol="0" rtlCol="0" fromWordArt="0" anchor="ctr" anchorCtr="0" forceAA="0" compatLnSpc="1">
+              <a:prstTxWarp prst="textNoShape">
+                <a:avLst/>
+              </a:prstTxWarp>
+              <a:noAutofit/>
+            </a:bodyPr>
+            <a:lstStyle/>
+            <a:p>
+              <a:pPr algn="ctr"/>
+              <a:endParaRPr lang="en-US"/>
+            </a:p>
+          </p:txBody>
+        </p:sp>
+        <p:sp>
+          <p:nvSpPr>
+            <p:cNvPr id="44" name="Ellipse 43"/>
+            <p:cNvSpPr/>
+            <p:nvPr/>
+          </p:nvSpPr>
+          <p:spPr>
+            <a:xfrm>
+              <a:off x="370654" y="431049"/>
+              <a:ext cx="86546" cy="87734"/>
+            </a:xfrm>
+            <a:prstGeom prst="ellipse">
+              <a:avLst/>
+            </a:prstGeom>
+            <a:solidFill>
+              <a:schemeClr val="bg2"/>
+            </a:solidFill>
+            <a:ln>
+              <a:solidFill>
+                <a:schemeClr val="bg2">
+                  <a:lumMod val="75000"/>
+                </a:schemeClr>
+              </a:solidFill>
+            </a:ln>
+          </p:spPr>
+          <p:style>
+            <a:lnRef idx="2">
+              <a:schemeClr val="accent1">
+                <a:shade val="50000"/>
+              </a:schemeClr>
+            </a:lnRef>
+            <a:fillRef idx="1">
+              <a:schemeClr val="accent1"/>
+            </a:fillRef>
+            <a:effectRef idx="0">
+              <a:schemeClr val="accent1"/>
+            </a:effectRef>
+            <a:fontRef idx="minor">
+              <a:schemeClr val="lt1"/>
+            </a:fontRef>
+          </p:style>
+          <p:txBody>
+            <a:bodyPr rot="0" spcFirstLastPara="0" vertOverflow="overflow" horzOverflow="overflow" vert="horz" wrap="square" lIns="91440" tIns="45720" rIns="91440" bIns="45720" numCol="1" spcCol="0" rtlCol="0" fromWordArt="0" anchor="ctr" anchorCtr="0" forceAA="0" compatLnSpc="1">
+              <a:prstTxWarp prst="textNoShape">
+                <a:avLst/>
+              </a:prstTxWarp>
+              <a:noAutofit/>
+            </a:bodyPr>
+            <a:lstStyle/>
+            <a:p>
+              <a:pPr algn="ctr"/>
+              <a:endParaRPr lang="en-US"/>
+            </a:p>
+          </p:txBody>
+        </p:sp>
+      </p:grpSp>
+    </p:spTree>
+    <p:extLst>
+      <p:ext uri="{BB962C8B-B14F-4D97-AF65-F5344CB8AC3E}">
+        <p14:creationId xmlns:p14="http://schemas.microsoft.com/office/powerpoint/2010/main" val="2621718715"/>
+      </p:ext>
+    </p:extLst>
+  </p:cSld>
+  <p:clrMapOvr>
+    <a:masterClrMapping/>
+  </p:clrMapOvr>
+  <p:timing>
+    <p:tnLst>
+      <p:par>
+        <p:cTn id="1" dur="indefinite" restart="never" nodeType="tmRoot"/>
+      </p:par>
+    </p:tnLst>
+  </p:timing>
+</p:sld>
+</file>
+
+<file path=ppt/slides/slide4.xml><?xml version="1.0" encoding="utf-8"?>
 <p:sld xmlns:a="http://schemas.openxmlformats.org/drawingml/2006/main" xmlns:r="http://schemas.openxmlformats.org/officeDocument/2006/relationships" xmlns:p="http://schemas.openxmlformats.org/presentationml/2006/main">
   <p:cSld>
     <p:spTree>
@@ -6831,7 +7421,7 @@
 </p:sld>
 </file>
 
-<file path=ppt/slides/slide4.xml><?xml version="1.0" encoding="utf-8"?>
+<file path=ppt/slides/slide5.xml><?xml version="1.0" encoding="utf-8"?>
 <p:sld xmlns:a="http://schemas.openxmlformats.org/drawingml/2006/main" xmlns:r="http://schemas.openxmlformats.org/officeDocument/2006/relationships" xmlns:p="http://schemas.openxmlformats.org/presentationml/2006/main">
   <p:cSld>
     <p:spTree>
@@ -8153,7 +8743,7 @@
 </p:sld>
 </file>
 
-<file path=ppt/slides/slide5.xml><?xml version="1.0" encoding="utf-8"?>
+<file path=ppt/slides/slide6.xml><?xml version="1.0" encoding="utf-8"?>
 <p:sld xmlns:a="http://schemas.openxmlformats.org/drawingml/2006/main" xmlns:r="http://schemas.openxmlformats.org/officeDocument/2006/relationships" xmlns:p="http://schemas.openxmlformats.org/presentationml/2006/main">
   <p:cSld>
     <p:spTree>
@@ -8280,7 +8870,7 @@
 </p:sld>
 </file>
 
-<file path=ppt/slides/slide6.xml><?xml version="1.0" encoding="utf-8"?>
+<file path=ppt/slides/slide7.xml><?xml version="1.0" encoding="utf-8"?>
 <p:sld xmlns:a="http://schemas.openxmlformats.org/drawingml/2006/main" xmlns:r="http://schemas.openxmlformats.org/officeDocument/2006/relationships" xmlns:p="http://schemas.openxmlformats.org/presentationml/2006/main">
   <p:cSld>
     <p:spTree>

</xml_diff>